<commit_message>
added car images and the edited ppt
</commit_message>
<xml_diff>
--- a/Capstone Project 3.pptx
+++ b/Capstone Project 3.pptx
@@ -4345,13 +4345,13 @@
         </p:spPr>
         <p:txBody>
           <a:bodyPr>
-            <a:normAutofit/>
+            <a:normAutofit fontScale="70000" lnSpcReduction="20000"/>
           </a:bodyPr>
           <a:lstStyle/>
           <a:p>
             <a:r>
               <a:rPr lang="en-US" dirty="0"/>
-              <a:t>We can use feature importance to add variables to will enhance the model accuracy.</a:t>
+              <a:t>We can use feature importance to add/remove variables to will enhance the model accuracy.</a:t>
             </a:r>
           </a:p>
           <a:p>
@@ -4362,7 +4362,22 @@
               </a:rPr>
               <a:t>We can investigate the impact of the "seller" variable on the variation in selling prices across different car models.</a:t>
             </a:r>
-            <a:endParaRPr lang="en-US" dirty="0"/>
+          </a:p>
+          <a:p>
+            <a:r>
+              <a:rPr lang="en-US" dirty="0">
+                <a:latin typeface="Söhne"/>
+              </a:rPr>
+              <a:t>Look into the state variable and see how different models sell in each state. Are some states more expensive? Can you buy/sell the same model for a better price in certain states?</a:t>
+            </a:r>
+          </a:p>
+          <a:p>
+            <a:pPr marL="0" indent="0">
+              <a:buNone/>
+            </a:pPr>
+            <a:endParaRPr lang="en-US" dirty="0">
+              <a:latin typeface="Söhne"/>
+            </a:endParaRPr>
           </a:p>
         </p:txBody>
       </p:sp>
@@ -5084,11 +5099,11 @@
               <a:buNone/>
             </a:pPr>
             <a:r>
-              <a:rPr lang="en-US" b="0" i="0" u="none" strike="noStrike">
+              <a:rPr lang="en-US" b="0" i="0" u="none" strike="noStrike" dirty="0">
                 <a:effectLst/>
                 <a:latin typeface="Times New Roman" panose="02020603050405020304" pitchFamily="18" charset="0"/>
               </a:rPr>
-              <a:t>The goal of our project is to develop a web app that leverages machine learning to predict car prices. The web app aims to empower consumers with data-driven insights, assisting them in making informed decisions whether buying or selling cars. </a:t>
+              <a:t>The goal of our project is to develop a web app that leverages machine learning to predict car prices. The web app aims to empower consumers with data-driven insights, assisting them in making informed decisions when buying or selling cars. </a:t>
             </a:r>
             <a:endParaRPr lang="en-US" dirty="0"/>
           </a:p>
@@ -5645,7 +5660,7 @@
             </a:pPr>
             <a:r>
               <a:rPr lang="en-US" sz="1600" dirty="0"/>
-              <a:t>-Year	-Vin</a:t>
+              <a:t>-Year	-Vin	-Body</a:t>
             </a:r>
           </a:p>
           <a:p>
@@ -7931,6 +7946,38 @@
           </a:fontRef>
         </p:style>
       </p:cxnSp>
+      <p:sp>
+        <p:nvSpPr>
+          <p:cNvPr id="3" name="TextBox 2">
+            <a:extLst>
+              <a:ext uri="{FF2B5EF4-FFF2-40B4-BE49-F238E27FC236}">
+                <a16:creationId xmlns:a16="http://schemas.microsoft.com/office/drawing/2014/main" id="{06010F9C-48E6-BF9B-8487-5E11CC800C98}"/>
+              </a:ext>
+            </a:extLst>
+          </p:cNvPr>
+          <p:cNvSpPr txBox="1"/>
+          <p:nvPr/>
+        </p:nvSpPr>
+        <p:spPr>
+          <a:xfrm>
+            <a:off x="9269730" y="3886200"/>
+            <a:ext cx="2262581" cy="369332"/>
+          </a:xfrm>
+          <a:prstGeom prst="rect">
+            <a:avLst/>
+          </a:prstGeom>
+          <a:noFill/>
+        </p:spPr>
+        <p:txBody>
+          <a:bodyPr wrap="square" rtlCol="0">
+            <a:spAutoFit/>
+          </a:bodyPr>
+          <a:lstStyle/>
+          <a:p>
+            <a:endParaRPr lang="en-US" dirty="0"/>
+          </a:p>
+        </p:txBody>
+      </p:sp>
     </p:spTree>
     <p:extLst>
       <p:ext uri="{BB962C8B-B14F-4D97-AF65-F5344CB8AC3E}">

</xml_diff>